<commit_message>
misc changes from Co Springs talk
</commit_message>
<xml_diff>
--- a/Getting Started with Encryption in SQL 2016.pptx
+++ b/Getting Started with Encryption in SQL 2016.pptx
@@ -4576,6 +4576,13 @@
   <p:clrMapOvr>
     <a:masterClrMapping/>
   </p:clrMapOvr>
+  <p:timing>
+    <p:tnLst>
+      <p:par>
+        <p:cTn id="1" dur="indefinite" restart="never" nodeType="tmRoot"/>
+      </p:par>
+    </p:tnLst>
+  </p:timing>
 </p:sld>
 </file>
 
@@ -5359,21 +5366,21 @@
                 <a:gridCol w="919577">
                   <a:extLst>
                     <a:ext uri="{9D8B030D-6E8A-4147-A177-3AD203B41FA5}">
-                      <a16:colId xmlns:a16="http://schemas.microsoft.com/office/drawing/2014/main" xmlns="" val="20000"/>
+                      <a16:colId xmlns="" xmlns:a16="http://schemas.microsoft.com/office/drawing/2014/main" val="20000"/>
                     </a:ext>
                   </a:extLst>
                 </a:gridCol>
                 <a:gridCol w="1509204">
                   <a:extLst>
                     <a:ext uri="{9D8B030D-6E8A-4147-A177-3AD203B41FA5}">
-                      <a16:colId xmlns:a16="http://schemas.microsoft.com/office/drawing/2014/main" xmlns="" val="20001"/>
+                      <a16:colId xmlns="" xmlns:a16="http://schemas.microsoft.com/office/drawing/2014/main" val="20001"/>
                     </a:ext>
                   </a:extLst>
                 </a:gridCol>
                 <a:gridCol w="1695634">
                   <a:extLst>
                     <a:ext uri="{9D8B030D-6E8A-4147-A177-3AD203B41FA5}">
-                      <a16:colId xmlns:a16="http://schemas.microsoft.com/office/drawing/2014/main" xmlns="" val="20002"/>
+                      <a16:colId xmlns="" xmlns:a16="http://schemas.microsoft.com/office/drawing/2014/main" val="20002"/>
                     </a:ext>
                   </a:extLst>
                 </a:gridCol>
@@ -5423,7 +5430,7 @@
                 </a:tc>
                 <a:extLst>
                   <a:ext uri="{0D108BD9-81ED-4DB2-BD59-A6C34878D82A}">
-                    <a16:rowId xmlns:a16="http://schemas.microsoft.com/office/drawing/2014/main" xmlns="" val="10000"/>
+                    <a16:rowId xmlns="" xmlns:a16="http://schemas.microsoft.com/office/drawing/2014/main" val="10000"/>
                   </a:ext>
                 </a:extLst>
               </a:tr>
@@ -5469,7 +5476,7 @@
                 </a:tc>
                 <a:extLst>
                   <a:ext uri="{0D108BD9-81ED-4DB2-BD59-A6C34878D82A}">
-                    <a16:rowId xmlns:a16="http://schemas.microsoft.com/office/drawing/2014/main" xmlns="" val="10001"/>
+                    <a16:rowId xmlns="" xmlns:a16="http://schemas.microsoft.com/office/drawing/2014/main" val="10001"/>
                   </a:ext>
                 </a:extLst>
               </a:tr>
@@ -5515,7 +5522,7 @@
                 </a:tc>
                 <a:extLst>
                   <a:ext uri="{0D108BD9-81ED-4DB2-BD59-A6C34878D82A}">
-                    <a16:rowId xmlns:a16="http://schemas.microsoft.com/office/drawing/2014/main" xmlns="" val="10002"/>
+                    <a16:rowId xmlns="" xmlns:a16="http://schemas.microsoft.com/office/drawing/2014/main" val="10002"/>
                   </a:ext>
                 </a:extLst>
               </a:tr>
@@ -5561,7 +5568,7 @@
                 </a:tc>
                 <a:extLst>
                   <a:ext uri="{0D108BD9-81ED-4DB2-BD59-A6C34878D82A}">
-                    <a16:rowId xmlns:a16="http://schemas.microsoft.com/office/drawing/2014/main" xmlns="" val="10003"/>
+                    <a16:rowId xmlns="" xmlns:a16="http://schemas.microsoft.com/office/drawing/2014/main" val="10003"/>
                   </a:ext>
                 </a:extLst>
               </a:tr>
@@ -5607,7 +5614,7 @@
                 </a:tc>
                 <a:extLst>
                   <a:ext uri="{0D108BD9-81ED-4DB2-BD59-A6C34878D82A}">
-                    <a16:rowId xmlns:a16="http://schemas.microsoft.com/office/drawing/2014/main" xmlns="" val="10004"/>
+                    <a16:rowId xmlns="" xmlns:a16="http://schemas.microsoft.com/office/drawing/2014/main" val="10004"/>
                   </a:ext>
                 </a:extLst>
               </a:tr>
@@ -5653,7 +5660,7 @@
                 </a:tc>
                 <a:extLst>
                   <a:ext uri="{0D108BD9-81ED-4DB2-BD59-A6C34878D82A}">
-                    <a16:rowId xmlns:a16="http://schemas.microsoft.com/office/drawing/2014/main" xmlns="" val="10005"/>
+                    <a16:rowId xmlns="" xmlns:a16="http://schemas.microsoft.com/office/drawing/2014/main" val="10005"/>
                   </a:ext>
                 </a:extLst>
               </a:tr>
@@ -5699,7 +5706,7 @@
                 </a:tc>
                 <a:extLst>
                   <a:ext uri="{0D108BD9-81ED-4DB2-BD59-A6C34878D82A}">
-                    <a16:rowId xmlns:a16="http://schemas.microsoft.com/office/drawing/2014/main" xmlns="" val="10006"/>
+                    <a16:rowId xmlns="" xmlns:a16="http://schemas.microsoft.com/office/drawing/2014/main" val="10006"/>
                   </a:ext>
                 </a:extLst>
               </a:tr>
@@ -5735,21 +5742,21 @@
                 <a:gridCol w="966420">
                   <a:extLst>
                     <a:ext uri="{9D8B030D-6E8A-4147-A177-3AD203B41FA5}">
-                      <a16:colId xmlns:a16="http://schemas.microsoft.com/office/drawing/2014/main" xmlns="" val="20000"/>
+                      <a16:colId xmlns="" xmlns:a16="http://schemas.microsoft.com/office/drawing/2014/main" val="20000"/>
                     </a:ext>
                   </a:extLst>
                 </a:gridCol>
                 <a:gridCol w="1556061">
                   <a:extLst>
                     <a:ext uri="{9D8B030D-6E8A-4147-A177-3AD203B41FA5}">
-                      <a16:colId xmlns:a16="http://schemas.microsoft.com/office/drawing/2014/main" xmlns="" val="20001"/>
+                      <a16:colId xmlns="" xmlns:a16="http://schemas.microsoft.com/office/drawing/2014/main" val="20001"/>
                     </a:ext>
                   </a:extLst>
                 </a:gridCol>
                 <a:gridCol w="1714013">
                   <a:extLst>
                     <a:ext uri="{9D8B030D-6E8A-4147-A177-3AD203B41FA5}">
-                      <a16:colId xmlns:a16="http://schemas.microsoft.com/office/drawing/2014/main" xmlns="" val="20002"/>
+                      <a16:colId xmlns="" xmlns:a16="http://schemas.microsoft.com/office/drawing/2014/main" val="20002"/>
                     </a:ext>
                   </a:extLst>
                 </a:gridCol>
@@ -5799,7 +5806,7 @@
                 </a:tc>
                 <a:extLst>
                   <a:ext uri="{0D108BD9-81ED-4DB2-BD59-A6C34878D82A}">
-                    <a16:rowId xmlns:a16="http://schemas.microsoft.com/office/drawing/2014/main" xmlns="" val="10000"/>
+                    <a16:rowId xmlns="" xmlns:a16="http://schemas.microsoft.com/office/drawing/2014/main" val="10000"/>
                   </a:ext>
                 </a:extLst>
               </a:tr>
@@ -5845,7 +5852,7 @@
                 </a:tc>
                 <a:extLst>
                   <a:ext uri="{0D108BD9-81ED-4DB2-BD59-A6C34878D82A}">
-                    <a16:rowId xmlns:a16="http://schemas.microsoft.com/office/drawing/2014/main" xmlns="" val="10001"/>
+                    <a16:rowId xmlns="" xmlns:a16="http://schemas.microsoft.com/office/drawing/2014/main" val="10001"/>
                   </a:ext>
                 </a:extLst>
               </a:tr>
@@ -5891,7 +5898,7 @@
                 </a:tc>
                 <a:extLst>
                   <a:ext uri="{0D108BD9-81ED-4DB2-BD59-A6C34878D82A}">
-                    <a16:rowId xmlns:a16="http://schemas.microsoft.com/office/drawing/2014/main" xmlns="" val="10002"/>
+                    <a16:rowId xmlns="" xmlns:a16="http://schemas.microsoft.com/office/drawing/2014/main" val="10002"/>
                   </a:ext>
                 </a:extLst>
               </a:tr>
@@ -6031,21 +6038,21 @@
                 <a:gridCol w="998552">
                   <a:extLst>
                     <a:ext uri="{9D8B030D-6E8A-4147-A177-3AD203B41FA5}">
-                      <a16:colId xmlns:a16="http://schemas.microsoft.com/office/drawing/2014/main" xmlns="" val="20000"/>
+                      <a16:colId xmlns="" xmlns:a16="http://schemas.microsoft.com/office/drawing/2014/main" val="20000"/>
                     </a:ext>
                   </a:extLst>
                 </a:gridCol>
                 <a:gridCol w="1580225">
                   <a:extLst>
                     <a:ext uri="{9D8B030D-6E8A-4147-A177-3AD203B41FA5}">
-                      <a16:colId xmlns:a16="http://schemas.microsoft.com/office/drawing/2014/main" xmlns="" val="20001"/>
+                      <a16:colId xmlns="" xmlns:a16="http://schemas.microsoft.com/office/drawing/2014/main" val="20001"/>
                     </a:ext>
                   </a:extLst>
                 </a:gridCol>
                 <a:gridCol w="1553592">
                   <a:extLst>
                     <a:ext uri="{9D8B030D-6E8A-4147-A177-3AD203B41FA5}">
-                      <a16:colId xmlns:a16="http://schemas.microsoft.com/office/drawing/2014/main" xmlns="" val="20002"/>
+                      <a16:colId xmlns="" xmlns:a16="http://schemas.microsoft.com/office/drawing/2014/main" val="20002"/>
                     </a:ext>
                   </a:extLst>
                 </a:gridCol>
@@ -6095,7 +6102,7 @@
                 </a:tc>
                 <a:extLst>
                   <a:ext uri="{0D108BD9-81ED-4DB2-BD59-A6C34878D82A}">
-                    <a16:rowId xmlns:a16="http://schemas.microsoft.com/office/drawing/2014/main" xmlns="" val="10000"/>
+                    <a16:rowId xmlns="" xmlns:a16="http://schemas.microsoft.com/office/drawing/2014/main" val="10000"/>
                   </a:ext>
                 </a:extLst>
               </a:tr>
@@ -6141,7 +6148,7 @@
                 </a:tc>
                 <a:extLst>
                   <a:ext uri="{0D108BD9-81ED-4DB2-BD59-A6C34878D82A}">
-                    <a16:rowId xmlns:a16="http://schemas.microsoft.com/office/drawing/2014/main" xmlns="" val="10001"/>
+                    <a16:rowId xmlns="" xmlns:a16="http://schemas.microsoft.com/office/drawing/2014/main" val="10001"/>
                   </a:ext>
                 </a:extLst>
               </a:tr>
@@ -6187,7 +6194,7 @@
                 </a:tc>
                 <a:extLst>
                   <a:ext uri="{0D108BD9-81ED-4DB2-BD59-A6C34878D82A}">
-                    <a16:rowId xmlns:a16="http://schemas.microsoft.com/office/drawing/2014/main" xmlns="" val="10004"/>
+                    <a16:rowId xmlns="" xmlns:a16="http://schemas.microsoft.com/office/drawing/2014/main" val="10004"/>
                   </a:ext>
                 </a:extLst>
               </a:tr>
@@ -6233,7 +6240,7 @@
                 </a:tc>
                 <a:extLst>
                   <a:ext uri="{0D108BD9-81ED-4DB2-BD59-A6C34878D82A}">
-                    <a16:rowId xmlns:a16="http://schemas.microsoft.com/office/drawing/2014/main" xmlns="" val="10005"/>
+                    <a16:rowId xmlns="" xmlns:a16="http://schemas.microsoft.com/office/drawing/2014/main" val="10005"/>
                   </a:ext>
                 </a:extLst>
               </a:tr>
@@ -7190,6 +7197,13 @@
   <p:clrMapOvr>
     <a:masterClrMapping/>
   </p:clrMapOvr>
+  <p:timing>
+    <p:tnLst>
+      <p:par>
+        <p:cTn id="1" dur="indefinite" restart="never" nodeType="tmRoot"/>
+      </p:par>
+    </p:tnLst>
+  </p:timing>
 </p:sld>
 </file>
 
@@ -9430,6 +9444,13 @@
   <p:transition>
     <p:fade/>
   </p:transition>
+  <p:timing>
+    <p:tnLst>
+      <p:par>
+        <p:cTn id="1" dur="indefinite" restart="never" nodeType="tmRoot"/>
+      </p:par>
+    </p:tnLst>
+  </p:timing>
 </p:sld>
 </file>
 
@@ -9789,28 +9810,22 @@
           </a:p>
           <a:p>
             <a:r>
-              <a:rPr lang="en-US" dirty="0"/>
-              <a:t>Other?</a:t>
-            </a:r>
-          </a:p>
-          <a:p>
-            <a:r>
-              <a:rPr lang="en-US" dirty="0"/>
-              <a:t>Using </a:t>
-            </a:r>
-            <a:r>
-              <a:rPr lang="en-US" dirty="0" err="1"/>
-              <a:t>tSQLt</a:t>
+              <a:rPr lang="en-US"/>
+              <a:t>Other</a:t>
+            </a:r>
+            <a:r>
+              <a:rPr lang="en-US" smtClean="0"/>
+              <a:t>?</a:t>
+            </a:r>
+          </a:p>
+          <a:p>
+            <a:r>
+              <a:rPr lang="en-US" smtClean="0"/>
+              <a:t>Redgate</a:t>
             </a:r>
             <a:r>
               <a:rPr lang="en-US" dirty="0"/>
               <a:t>?</a:t>
-            </a:r>
-          </a:p>
-          <a:p>
-            <a:r>
-              <a:rPr lang="en-US" dirty="0"/>
-              <a:t>Redgate?</a:t>
             </a:r>
           </a:p>
           <a:p>
@@ -9831,6 +9846,13 @@
   <p:clrMapOvr>
     <a:masterClrMapping/>
   </p:clrMapOvr>
+  <p:timing>
+    <p:tnLst>
+      <p:par>
+        <p:cTn id="1" dur="indefinite" restart="never" nodeType="tmRoot"/>
+      </p:par>
+    </p:tnLst>
+  </p:timing>
 </p:sld>
 </file>
 
@@ -10009,6 +10031,13 @@
     <a:masterClrMapping/>
   </p:clrMapOvr>
   <p:transition/>
+  <p:timing>
+    <p:tnLst>
+      <p:par>
+        <p:cTn id="1" dur="indefinite" restart="never" nodeType="tmRoot"/>
+      </p:par>
+    </p:tnLst>
+  </p:timing>
 </p:sld>
 </file>
 

</xml_diff>